<commit_message>
Think about url_repository table
</commit_message>
<xml_diff>
--- a/Documents/구상도.pptx
+++ b/Documents/구상도.pptx
@@ -7,6 +7,7 @@
   <p:sldIdLst>
     <p:sldId id="256" r:id="rId2"/>
     <p:sldId id="257" r:id="rId3"/>
+    <p:sldId id="258" r:id="rId4"/>
   </p:sldIdLst>
   <p:sldSz cx="12192000" cy="6858000"/>
   <p:notesSz cx="6858000" cy="9144000"/>
@@ -244,7 +245,7 @@
           <a:p>
             <a:fld id="{0B328D8E-F9B7-4358-B7D4-4FA073B49FFA}" type="datetimeFigureOut">
               <a:rPr lang="ko-KR" altLang="en-US" smtClean="0"/>
-              <a:t>2020-04-27</a:t>
+              <a:t>2020-04-28</a:t>
             </a:fld>
             <a:endParaRPr lang="ko-KR" altLang="en-US"/>
           </a:p>
@@ -414,7 +415,7 @@
           <a:p>
             <a:fld id="{0B328D8E-F9B7-4358-B7D4-4FA073B49FFA}" type="datetimeFigureOut">
               <a:rPr lang="ko-KR" altLang="en-US" smtClean="0"/>
-              <a:t>2020-04-27</a:t>
+              <a:t>2020-04-28</a:t>
             </a:fld>
             <a:endParaRPr lang="ko-KR" altLang="en-US"/>
           </a:p>
@@ -594,7 +595,7 @@
           <a:p>
             <a:fld id="{0B328D8E-F9B7-4358-B7D4-4FA073B49FFA}" type="datetimeFigureOut">
               <a:rPr lang="ko-KR" altLang="en-US" smtClean="0"/>
-              <a:t>2020-04-27</a:t>
+              <a:t>2020-04-28</a:t>
             </a:fld>
             <a:endParaRPr lang="ko-KR" altLang="en-US"/>
           </a:p>
@@ -764,7 +765,7 @@
           <a:p>
             <a:fld id="{0B328D8E-F9B7-4358-B7D4-4FA073B49FFA}" type="datetimeFigureOut">
               <a:rPr lang="ko-KR" altLang="en-US" smtClean="0"/>
-              <a:t>2020-04-27</a:t>
+              <a:t>2020-04-28</a:t>
             </a:fld>
             <a:endParaRPr lang="ko-KR" altLang="en-US"/>
           </a:p>
@@ -1010,7 +1011,7 @@
           <a:p>
             <a:fld id="{0B328D8E-F9B7-4358-B7D4-4FA073B49FFA}" type="datetimeFigureOut">
               <a:rPr lang="ko-KR" altLang="en-US" smtClean="0"/>
-              <a:t>2020-04-27</a:t>
+              <a:t>2020-04-28</a:t>
             </a:fld>
             <a:endParaRPr lang="ko-KR" altLang="en-US"/>
           </a:p>
@@ -1242,7 +1243,7 @@
           <a:p>
             <a:fld id="{0B328D8E-F9B7-4358-B7D4-4FA073B49FFA}" type="datetimeFigureOut">
               <a:rPr lang="ko-KR" altLang="en-US" smtClean="0"/>
-              <a:t>2020-04-27</a:t>
+              <a:t>2020-04-28</a:t>
             </a:fld>
             <a:endParaRPr lang="ko-KR" altLang="en-US"/>
           </a:p>
@@ -1609,7 +1610,7 @@
           <a:p>
             <a:fld id="{0B328D8E-F9B7-4358-B7D4-4FA073B49FFA}" type="datetimeFigureOut">
               <a:rPr lang="ko-KR" altLang="en-US" smtClean="0"/>
-              <a:t>2020-04-27</a:t>
+              <a:t>2020-04-28</a:t>
             </a:fld>
             <a:endParaRPr lang="ko-KR" altLang="en-US"/>
           </a:p>
@@ -1727,7 +1728,7 @@
           <a:p>
             <a:fld id="{0B328D8E-F9B7-4358-B7D4-4FA073B49FFA}" type="datetimeFigureOut">
               <a:rPr lang="ko-KR" altLang="en-US" smtClean="0"/>
-              <a:t>2020-04-27</a:t>
+              <a:t>2020-04-28</a:t>
             </a:fld>
             <a:endParaRPr lang="ko-KR" altLang="en-US"/>
           </a:p>
@@ -1822,7 +1823,7 @@
           <a:p>
             <a:fld id="{0B328D8E-F9B7-4358-B7D4-4FA073B49FFA}" type="datetimeFigureOut">
               <a:rPr lang="ko-KR" altLang="en-US" smtClean="0"/>
-              <a:t>2020-04-27</a:t>
+              <a:t>2020-04-28</a:t>
             </a:fld>
             <a:endParaRPr lang="ko-KR" altLang="en-US"/>
           </a:p>
@@ -2099,7 +2100,7 @@
           <a:p>
             <a:fld id="{0B328D8E-F9B7-4358-B7D4-4FA073B49FFA}" type="datetimeFigureOut">
               <a:rPr lang="ko-KR" altLang="en-US" smtClean="0"/>
-              <a:t>2020-04-27</a:t>
+              <a:t>2020-04-28</a:t>
             </a:fld>
             <a:endParaRPr lang="ko-KR" altLang="en-US"/>
           </a:p>
@@ -2352,7 +2353,7 @@
           <a:p>
             <a:fld id="{0B328D8E-F9B7-4358-B7D4-4FA073B49FFA}" type="datetimeFigureOut">
               <a:rPr lang="ko-KR" altLang="en-US" smtClean="0"/>
-              <a:t>2020-04-27</a:t>
+              <a:t>2020-04-28</a:t>
             </a:fld>
             <a:endParaRPr lang="ko-KR" altLang="en-US"/>
           </a:p>
@@ -2565,7 +2566,7 @@
           <a:p>
             <a:fld id="{0B328D8E-F9B7-4358-B7D4-4FA073B49FFA}" type="datetimeFigureOut">
               <a:rPr lang="ko-KR" altLang="en-US" smtClean="0"/>
-              <a:t>2020-04-27</a:t>
+              <a:t>2020-04-28</a:t>
             </a:fld>
             <a:endParaRPr lang="ko-KR" altLang="en-US"/>
           </a:p>
@@ -3280,6 +3281,29 @@
               <a:rPr lang="en-US" altLang="ko-KR" dirty="0" smtClean="0"/>
               <a:t>DB</a:t>
             </a:r>
+          </a:p>
+          <a:p>
+            <a:pPr algn="ctr"/>
+            <a:r>
+              <a:rPr lang="en-US" altLang="ko-KR" dirty="0" smtClean="0"/>
+              <a:t>(</a:t>
+            </a:r>
+            <a:r>
+              <a:rPr lang="en-US" altLang="ko-KR" dirty="0" err="1" smtClean="0"/>
+              <a:t>url</a:t>
+            </a:r>
+            <a:r>
+              <a:rPr lang="en-US" altLang="ko-KR" dirty="0" err="1"/>
+              <a:t>_</a:t>
+            </a:r>
+            <a:r>
+              <a:rPr lang="en-US" altLang="ko-KR" dirty="0" err="1" smtClean="0"/>
+              <a:t>repository</a:t>
+            </a:r>
+            <a:r>
+              <a:rPr lang="en-US" altLang="ko-KR" dirty="0" smtClean="0"/>
+              <a:t>)</a:t>
+            </a:r>
             <a:endParaRPr lang="ko-KR" altLang="en-US" dirty="0"/>
           </a:p>
         </p:txBody>
@@ -3332,12 +3356,8 @@
               <a:rPr lang="en-US" altLang="ko-KR" dirty="0" smtClean="0"/>
             </a:br>
             <a:r>
-              <a:rPr lang="ko-KR" altLang="en-US" dirty="0" smtClean="0"/>
-              <a:t>보관 </a:t>
-            </a:r>
-            <a:r>
               <a:rPr lang="en-US" altLang="ko-KR" dirty="0" smtClean="0"/>
-              <a:t>site</a:t>
+              <a:t>DB</a:t>
             </a:r>
             <a:endParaRPr lang="ko-KR" altLang="en-US" dirty="0"/>
           </a:p>
@@ -4069,12 +4089,16 @@
             <a:graphicFrameLocks noGrp="1"/>
           </p:cNvGraphicFramePr>
           <p:nvPr>
-            <p:extLst/>
+            <p:extLst>
+              <p:ext uri="{D42A27DB-BD31-4B8C-83A1-F6EECF244321}">
+                <p14:modId xmlns:p14="http://schemas.microsoft.com/office/powerpoint/2010/main" val="3621506639"/>
+              </p:ext>
+            </p:extLst>
           </p:nvPr>
         </p:nvGraphicFramePr>
         <p:xfrm>
           <a:off x="366485" y="1389137"/>
-          <a:ext cx="11504388" cy="3885303"/>
+          <a:ext cx="11504388" cy="4734187"/>
         </p:xfrm>
         <a:graphic>
           <a:graphicData uri="http://schemas.openxmlformats.org/drawingml/2006/table">
@@ -4417,8 +4441,8 @@
                     <a:p>
                       <a:pPr latinLnBrk="1"/>
                       <a:r>
-                        <a:rPr lang="en-US" altLang="ko-KR" dirty="0" smtClean="0"/>
-                        <a:t>time</a:t>
+                        <a:rPr lang="en-US" altLang="ko-KR" dirty="0" err="1" smtClean="0"/>
+                        <a:t>Insert_time</a:t>
                       </a:r>
                       <a:endParaRPr lang="ko-KR" altLang="en-US" dirty="0"/>
                     </a:p>
@@ -4511,6 +4535,87 @@
                       <a:pPr latinLnBrk="1"/>
                       <a:r>
                         <a:rPr lang="en-US" altLang="ko-KR" dirty="0" err="1" smtClean="0"/>
+                        <a:t>Update_time</a:t>
+                      </a:r>
+                      <a:endParaRPr lang="ko-KR" altLang="en-US" dirty="0"/>
+                    </a:p>
+                  </a:txBody>
+                  <a:tcPr anchor="ctr"/>
+                </a:tc>
+                <a:tc>
+                  <a:txBody>
+                    <a:bodyPr/>
+                    <a:lstStyle/>
+                    <a:p>
+                      <a:pPr latinLnBrk="1"/>
+                      <a:endParaRPr lang="ko-KR" altLang="en-US" dirty="0"/>
+                    </a:p>
+                  </a:txBody>
+                  <a:tcPr anchor="ctr"/>
+                </a:tc>
+                <a:tc>
+                  <a:txBody>
+                    <a:bodyPr/>
+                    <a:lstStyle/>
+                    <a:p>
+                      <a:pPr latinLnBrk="1"/>
+                      <a:r>
+                        <a:rPr lang="en-US" altLang="ko-KR" dirty="0" smtClean="0"/>
+                        <a:t>YES</a:t>
+                      </a:r>
+                      <a:endParaRPr lang="ko-KR" altLang="en-US" dirty="0"/>
+                    </a:p>
+                  </a:txBody>
+                  <a:tcPr anchor="ctr"/>
+                </a:tc>
+                <a:tc>
+                  <a:txBody>
+                    <a:bodyPr/>
+                    <a:lstStyle/>
+                    <a:p>
+                      <a:pPr latinLnBrk="1"/>
+                      <a:endParaRPr lang="ko-KR" altLang="en-US" dirty="0"/>
+                    </a:p>
+                  </a:txBody>
+                  <a:tcPr anchor="ctr"/>
+                </a:tc>
+                <a:tc>
+                  <a:txBody>
+                    <a:bodyPr/>
+                    <a:lstStyle/>
+                    <a:p>
+                      <a:pPr latinLnBrk="1"/>
+                      <a:endParaRPr lang="ko-KR" altLang="en-US" dirty="0"/>
+                    </a:p>
+                  </a:txBody>
+                  <a:tcPr anchor="ctr"/>
+                </a:tc>
+                <a:tc>
+                  <a:txBody>
+                    <a:bodyPr/>
+                    <a:lstStyle/>
+                    <a:p>
+                      <a:pPr latinLnBrk="1"/>
+                      <a:endParaRPr lang="ko-KR" altLang="en-US" dirty="0"/>
+                    </a:p>
+                  </a:txBody>
+                  <a:tcPr anchor="ctr"/>
+                </a:tc>
+                <a:extLst>
+                  <a:ext uri="{0D108BD9-81ED-4DB2-BD59-A6C34878D82A}">
+                    <a16:rowId xmlns:a16="http://schemas.microsoft.com/office/drawing/2014/main" val="3254889965"/>
+                  </a:ext>
+                </a:extLst>
+              </a:tr>
+              <a:tr h="848884">
+                <a:tc>
+                  <a:txBody>
+                    <a:bodyPr/>
+                    <a:lstStyle/>
+                    <a:p>
+                      <a:pPr latinLnBrk="1"/>
+                      <a:r>
+                        <a:rPr lang="en-US" altLang="ko-KR" dirty="0" err="1" smtClean="0"/>
                         <a:t>Wob</a:t>
                       </a:r>
                       <a:endParaRPr lang="ko-KR" altLang="en-US" dirty="0"/>
@@ -4541,7 +4646,7 @@
                       <a:pPr latinLnBrk="1"/>
                       <a:r>
                         <a:rPr lang="en-US" altLang="ko-KR" dirty="0" smtClean="0"/>
-                        <a:t>NO</a:t>
+                        <a:t>YES</a:t>
                       </a:r>
                       <a:endParaRPr lang="ko-KR" altLang="en-US" dirty="0"/>
                     </a:p>
@@ -4631,68 +4736,6 @@
       </p:sp>
       <p:sp>
         <p:nvSpPr>
-          <p:cNvPr id="6" name="TextBox 5"/>
-          <p:cNvSpPr txBox="1"/>
-          <p:nvPr/>
-        </p:nvSpPr>
-        <p:spPr>
-          <a:xfrm>
-            <a:off x="366485" y="6123214"/>
-            <a:ext cx="9823908" cy="369332"/>
-          </a:xfrm>
-          <a:prstGeom prst="rect">
-            <a:avLst/>
-          </a:prstGeom>
-          <a:noFill/>
-        </p:spPr>
-        <p:txBody>
-          <a:bodyPr wrap="none" rtlCol="0">
-            <a:spAutoFit/>
-          </a:bodyPr>
-          <a:lstStyle/>
-          <a:p>
-            <a:r>
-              <a:rPr lang="en-US" altLang="ko-KR" dirty="0" smtClean="0"/>
-              <a:t>Timestamp </a:t>
-            </a:r>
-            <a:r>
-              <a:rPr lang="ko-KR" altLang="en-US" dirty="0" smtClean="0"/>
-              <a:t>는 </a:t>
-            </a:r>
-            <a:r>
-              <a:rPr lang="ko-KR" altLang="en-US" dirty="0" err="1" smtClean="0"/>
-              <a:t>숫자형으로</a:t>
-            </a:r>
-            <a:r>
-              <a:rPr lang="ko-KR" altLang="en-US" dirty="0" smtClean="0"/>
-              <a:t> 저장</a:t>
-            </a:r>
-            <a:r>
-              <a:rPr lang="en-US" altLang="ko-KR" dirty="0" smtClean="0"/>
-              <a:t>, 4byte </a:t>
-            </a:r>
-            <a:r>
-              <a:rPr lang="ko-KR" altLang="en-US" dirty="0" smtClean="0"/>
-              <a:t>차지 날짜 입력</a:t>
-            </a:r>
-            <a:r>
-              <a:rPr lang="en-US" altLang="ko-KR" dirty="0" smtClean="0"/>
-              <a:t>,</a:t>
-            </a:r>
-            <a:r>
-              <a:rPr lang="ko-KR" altLang="en-US" dirty="0" smtClean="0"/>
-              <a:t> 따로 안해줘도 자동으로 입력이 가능</a:t>
-            </a:r>
-            <a:r>
-              <a:rPr lang="en-US" altLang="ko-KR" dirty="0" smtClean="0"/>
-              <a:t>. </a:t>
-            </a:r>
-            <a:endParaRPr lang="ko-KR" altLang="en-US" dirty="0"/>
-          </a:p>
-        </p:txBody>
-      </p:sp>
-      <p:sp>
-        <p:nvSpPr>
           <p:cNvPr id="2" name="TextBox 1"/>
           <p:cNvSpPr txBox="1"/>
           <p:nvPr/>
@@ -4733,6 +4776,778 @@
     <p:extLst>
       <p:ext uri="{BB962C8B-B14F-4D97-AF65-F5344CB8AC3E}">
         <p14:creationId xmlns:p14="http://schemas.microsoft.com/office/powerpoint/2010/main" val="3216529735"/>
+      </p:ext>
+    </p:extLst>
+  </p:cSld>
+  <p:clrMapOvr>
+    <a:masterClrMapping/>
+  </p:clrMapOvr>
+</p:sld>
+</file>
+
+<file path=ppt/slides/slide3.xml><?xml version="1.0" encoding="utf-8"?>
+<p:sld xmlns:a="http://schemas.openxmlformats.org/drawingml/2006/main" xmlns:r="http://schemas.openxmlformats.org/officeDocument/2006/relationships" xmlns:p="http://schemas.openxmlformats.org/presentationml/2006/main">
+  <p:cSld>
+    <p:spTree>
+      <p:nvGrpSpPr>
+        <p:cNvPr id="1" name=""/>
+        <p:cNvGrpSpPr/>
+        <p:nvPr/>
+      </p:nvGrpSpPr>
+      <p:grpSpPr>
+        <a:xfrm>
+          <a:off x="0" y="0"/>
+          <a:ext cx="0" cy="0"/>
+          <a:chOff x="0" y="0"/>
+          <a:chExt cx="0" cy="0"/>
+        </a:xfrm>
+      </p:grpSpPr>
+      <p:graphicFrame>
+        <p:nvGraphicFramePr>
+          <p:cNvPr id="4" name="표 3"/>
+          <p:cNvGraphicFramePr>
+            <a:graphicFrameLocks noGrp="1"/>
+          </p:cNvGraphicFramePr>
+          <p:nvPr>
+            <p:extLst>
+              <p:ext uri="{D42A27DB-BD31-4B8C-83A1-F6EECF244321}">
+                <p14:modId xmlns:p14="http://schemas.microsoft.com/office/powerpoint/2010/main" val="3956847448"/>
+              </p:ext>
+            </p:extLst>
+          </p:nvPr>
+        </p:nvGraphicFramePr>
+        <p:xfrm>
+          <a:off x="1943100" y="1011766"/>
+          <a:ext cx="8128000" cy="1112520"/>
+        </p:xfrm>
+        <a:graphic>
+          <a:graphicData uri="http://schemas.openxmlformats.org/drawingml/2006/table">
+            <a:tbl>
+              <a:tblPr firstRow="1" bandRow="1">
+                <a:tableStyleId>{5940675A-B579-460E-94D1-54222C63F5DA}</a:tableStyleId>
+              </a:tblPr>
+              <a:tblGrid>
+                <a:gridCol w="1016000">
+                  <a:extLst>
+                    <a:ext uri="{9D8B030D-6E8A-4147-A177-3AD203B41FA5}">
+                      <a16:colId xmlns:a16="http://schemas.microsoft.com/office/drawing/2014/main" val="1636198692"/>
+                    </a:ext>
+                  </a:extLst>
+                </a:gridCol>
+                <a:gridCol w="1016000">
+                  <a:extLst>
+                    <a:ext uri="{9D8B030D-6E8A-4147-A177-3AD203B41FA5}">
+                      <a16:colId xmlns:a16="http://schemas.microsoft.com/office/drawing/2014/main" val="481933961"/>
+                    </a:ext>
+                  </a:extLst>
+                </a:gridCol>
+                <a:gridCol w="1016000">
+                  <a:extLst>
+                    <a:ext uri="{9D8B030D-6E8A-4147-A177-3AD203B41FA5}">
+                      <a16:colId xmlns:a16="http://schemas.microsoft.com/office/drawing/2014/main" val="3415793772"/>
+                    </a:ext>
+                  </a:extLst>
+                </a:gridCol>
+                <a:gridCol w="1016000">
+                  <a:extLst>
+                    <a:ext uri="{9D8B030D-6E8A-4147-A177-3AD203B41FA5}">
+                      <a16:colId xmlns:a16="http://schemas.microsoft.com/office/drawing/2014/main" val="2852768689"/>
+                    </a:ext>
+                  </a:extLst>
+                </a:gridCol>
+                <a:gridCol w="1016000">
+                  <a:extLst>
+                    <a:ext uri="{9D8B030D-6E8A-4147-A177-3AD203B41FA5}">
+                      <a16:colId xmlns:a16="http://schemas.microsoft.com/office/drawing/2014/main" val="2144937605"/>
+                    </a:ext>
+                  </a:extLst>
+                </a:gridCol>
+                <a:gridCol w="1016000">
+                  <a:extLst>
+                    <a:ext uri="{9D8B030D-6E8A-4147-A177-3AD203B41FA5}">
+                      <a16:colId xmlns:a16="http://schemas.microsoft.com/office/drawing/2014/main" val="1376724382"/>
+                    </a:ext>
+                  </a:extLst>
+                </a:gridCol>
+                <a:gridCol w="1016000">
+                  <a:extLst>
+                    <a:ext uri="{9D8B030D-6E8A-4147-A177-3AD203B41FA5}">
+                      <a16:colId xmlns:a16="http://schemas.microsoft.com/office/drawing/2014/main" val="3473342088"/>
+                    </a:ext>
+                  </a:extLst>
+                </a:gridCol>
+                <a:gridCol w="1016000">
+                  <a:extLst>
+                    <a:ext uri="{9D8B030D-6E8A-4147-A177-3AD203B41FA5}">
+                      <a16:colId xmlns:a16="http://schemas.microsoft.com/office/drawing/2014/main" val="3687628291"/>
+                    </a:ext>
+                  </a:extLst>
+                </a:gridCol>
+              </a:tblGrid>
+              <a:tr h="370840">
+                <a:tc>
+                  <a:txBody>
+                    <a:bodyPr/>
+                    <a:lstStyle/>
+                    <a:p>
+                      <a:pPr latinLnBrk="1"/>
+                      <a:endParaRPr lang="ko-KR" altLang="en-US" dirty="0"/>
+                    </a:p>
+                  </a:txBody>
+                  <a:tcPr/>
+                </a:tc>
+                <a:tc>
+                  <a:txBody>
+                    <a:bodyPr/>
+                    <a:lstStyle/>
+                    <a:p>
+                      <a:pPr latinLnBrk="1"/>
+                      <a:endParaRPr lang="ko-KR" altLang="en-US"/>
+                    </a:p>
+                  </a:txBody>
+                  <a:tcPr/>
+                </a:tc>
+                <a:tc>
+                  <a:txBody>
+                    <a:bodyPr/>
+                    <a:lstStyle/>
+                    <a:p>
+                      <a:pPr latinLnBrk="1"/>
+                      <a:endParaRPr lang="ko-KR" altLang="en-US"/>
+                    </a:p>
+                  </a:txBody>
+                  <a:tcPr/>
+                </a:tc>
+                <a:tc>
+                  <a:txBody>
+                    <a:bodyPr/>
+                    <a:lstStyle/>
+                    <a:p>
+                      <a:pPr latinLnBrk="1"/>
+                      <a:endParaRPr lang="ko-KR" altLang="en-US"/>
+                    </a:p>
+                  </a:txBody>
+                  <a:tcPr/>
+                </a:tc>
+                <a:tc>
+                  <a:txBody>
+                    <a:bodyPr/>
+                    <a:lstStyle/>
+                    <a:p>
+                      <a:pPr latinLnBrk="1"/>
+                      <a:endParaRPr lang="ko-KR" altLang="en-US"/>
+                    </a:p>
+                  </a:txBody>
+                  <a:tcPr/>
+                </a:tc>
+                <a:tc>
+                  <a:txBody>
+                    <a:bodyPr/>
+                    <a:lstStyle/>
+                    <a:p>
+                      <a:pPr latinLnBrk="1"/>
+                      <a:endParaRPr lang="ko-KR" altLang="en-US"/>
+                    </a:p>
+                  </a:txBody>
+                  <a:tcPr/>
+                </a:tc>
+                <a:tc>
+                  <a:txBody>
+                    <a:bodyPr/>
+                    <a:lstStyle/>
+                    <a:p>
+                      <a:pPr latinLnBrk="1"/>
+                      <a:endParaRPr lang="ko-KR" altLang="en-US"/>
+                    </a:p>
+                  </a:txBody>
+                  <a:tcPr/>
+                </a:tc>
+                <a:tc>
+                  <a:txBody>
+                    <a:bodyPr/>
+                    <a:lstStyle/>
+                    <a:p>
+                      <a:pPr latinLnBrk="1"/>
+                      <a:endParaRPr lang="ko-KR" altLang="en-US"/>
+                    </a:p>
+                  </a:txBody>
+                  <a:tcPr/>
+                </a:tc>
+                <a:extLst>
+                  <a:ext uri="{0D108BD9-81ED-4DB2-BD59-A6C34878D82A}">
+                    <a16:rowId xmlns:a16="http://schemas.microsoft.com/office/drawing/2014/main" val="2954241271"/>
+                  </a:ext>
+                </a:extLst>
+              </a:tr>
+              <a:tr h="370840">
+                <a:tc>
+                  <a:txBody>
+                    <a:bodyPr/>
+                    <a:lstStyle/>
+                    <a:p>
+                      <a:pPr latinLnBrk="1"/>
+                      <a:endParaRPr lang="ko-KR" altLang="en-US"/>
+                    </a:p>
+                  </a:txBody>
+                  <a:tcPr/>
+                </a:tc>
+                <a:tc>
+                  <a:txBody>
+                    <a:bodyPr/>
+                    <a:lstStyle/>
+                    <a:p>
+                      <a:pPr latinLnBrk="1"/>
+                      <a:endParaRPr lang="ko-KR" altLang="en-US"/>
+                    </a:p>
+                  </a:txBody>
+                  <a:tcPr/>
+                </a:tc>
+                <a:tc>
+                  <a:txBody>
+                    <a:bodyPr/>
+                    <a:lstStyle/>
+                    <a:p>
+                      <a:pPr latinLnBrk="1"/>
+                      <a:endParaRPr lang="ko-KR" altLang="en-US"/>
+                    </a:p>
+                  </a:txBody>
+                  <a:tcPr/>
+                </a:tc>
+                <a:tc>
+                  <a:txBody>
+                    <a:bodyPr/>
+                    <a:lstStyle/>
+                    <a:p>
+                      <a:pPr latinLnBrk="1"/>
+                      <a:endParaRPr lang="ko-KR" altLang="en-US"/>
+                    </a:p>
+                  </a:txBody>
+                  <a:tcPr/>
+                </a:tc>
+                <a:tc>
+                  <a:txBody>
+                    <a:bodyPr/>
+                    <a:lstStyle/>
+                    <a:p>
+                      <a:pPr latinLnBrk="1"/>
+                      <a:endParaRPr lang="ko-KR" altLang="en-US"/>
+                    </a:p>
+                  </a:txBody>
+                  <a:tcPr/>
+                </a:tc>
+                <a:tc>
+                  <a:txBody>
+                    <a:bodyPr/>
+                    <a:lstStyle/>
+                    <a:p>
+                      <a:pPr latinLnBrk="1"/>
+                      <a:endParaRPr lang="ko-KR" altLang="en-US"/>
+                    </a:p>
+                  </a:txBody>
+                  <a:tcPr/>
+                </a:tc>
+                <a:tc>
+                  <a:txBody>
+                    <a:bodyPr/>
+                    <a:lstStyle/>
+                    <a:p>
+                      <a:pPr latinLnBrk="1"/>
+                      <a:endParaRPr lang="ko-KR" altLang="en-US"/>
+                    </a:p>
+                  </a:txBody>
+                  <a:tcPr/>
+                </a:tc>
+                <a:tc>
+                  <a:txBody>
+                    <a:bodyPr/>
+                    <a:lstStyle/>
+                    <a:p>
+                      <a:pPr latinLnBrk="1"/>
+                      <a:endParaRPr lang="ko-KR" altLang="en-US"/>
+                    </a:p>
+                  </a:txBody>
+                  <a:tcPr/>
+                </a:tc>
+                <a:extLst>
+                  <a:ext uri="{0D108BD9-81ED-4DB2-BD59-A6C34878D82A}">
+                    <a16:rowId xmlns:a16="http://schemas.microsoft.com/office/drawing/2014/main" val="1815343335"/>
+                  </a:ext>
+                </a:extLst>
+              </a:tr>
+              <a:tr h="370840">
+                <a:tc>
+                  <a:txBody>
+                    <a:bodyPr/>
+                    <a:lstStyle/>
+                    <a:p>
+                      <a:pPr latinLnBrk="1"/>
+                      <a:endParaRPr lang="ko-KR" altLang="en-US"/>
+                    </a:p>
+                  </a:txBody>
+                  <a:tcPr/>
+                </a:tc>
+                <a:tc>
+                  <a:txBody>
+                    <a:bodyPr/>
+                    <a:lstStyle/>
+                    <a:p>
+                      <a:pPr latinLnBrk="1"/>
+                      <a:endParaRPr lang="ko-KR" altLang="en-US"/>
+                    </a:p>
+                  </a:txBody>
+                  <a:tcPr/>
+                </a:tc>
+                <a:tc>
+                  <a:txBody>
+                    <a:bodyPr/>
+                    <a:lstStyle/>
+                    <a:p>
+                      <a:pPr latinLnBrk="1"/>
+                      <a:endParaRPr lang="ko-KR" altLang="en-US"/>
+                    </a:p>
+                  </a:txBody>
+                  <a:tcPr/>
+                </a:tc>
+                <a:tc>
+                  <a:txBody>
+                    <a:bodyPr/>
+                    <a:lstStyle/>
+                    <a:p>
+                      <a:pPr latinLnBrk="1"/>
+                      <a:endParaRPr lang="ko-KR" altLang="en-US"/>
+                    </a:p>
+                  </a:txBody>
+                  <a:tcPr/>
+                </a:tc>
+                <a:tc>
+                  <a:txBody>
+                    <a:bodyPr/>
+                    <a:lstStyle/>
+                    <a:p>
+                      <a:pPr latinLnBrk="1"/>
+                      <a:endParaRPr lang="ko-KR" altLang="en-US"/>
+                    </a:p>
+                  </a:txBody>
+                  <a:tcPr/>
+                </a:tc>
+                <a:tc>
+                  <a:txBody>
+                    <a:bodyPr/>
+                    <a:lstStyle/>
+                    <a:p>
+                      <a:pPr latinLnBrk="1"/>
+                      <a:endParaRPr lang="ko-KR" altLang="en-US"/>
+                    </a:p>
+                  </a:txBody>
+                  <a:tcPr/>
+                </a:tc>
+                <a:tc>
+                  <a:txBody>
+                    <a:bodyPr/>
+                    <a:lstStyle/>
+                    <a:p>
+                      <a:pPr latinLnBrk="1"/>
+                      <a:endParaRPr lang="ko-KR" altLang="en-US"/>
+                    </a:p>
+                  </a:txBody>
+                  <a:tcPr/>
+                </a:tc>
+                <a:tc>
+                  <a:txBody>
+                    <a:bodyPr/>
+                    <a:lstStyle/>
+                    <a:p>
+                      <a:pPr latinLnBrk="1"/>
+                      <a:endParaRPr lang="ko-KR" altLang="en-US" dirty="0"/>
+                    </a:p>
+                  </a:txBody>
+                  <a:tcPr/>
+                </a:tc>
+                <a:extLst>
+                  <a:ext uri="{0D108BD9-81ED-4DB2-BD59-A6C34878D82A}">
+                    <a16:rowId xmlns:a16="http://schemas.microsoft.com/office/drawing/2014/main" val="3975939568"/>
+                  </a:ext>
+                </a:extLst>
+              </a:tr>
+            </a:tbl>
+          </a:graphicData>
+        </a:graphic>
+      </p:graphicFrame>
+      <p:graphicFrame>
+        <p:nvGraphicFramePr>
+          <p:cNvPr id="5" name="표 4"/>
+          <p:cNvGraphicFramePr>
+            <a:graphicFrameLocks noGrp="1"/>
+          </p:cNvGraphicFramePr>
+          <p:nvPr>
+            <p:extLst>
+              <p:ext uri="{D42A27DB-BD31-4B8C-83A1-F6EECF244321}">
+                <p14:modId xmlns:p14="http://schemas.microsoft.com/office/powerpoint/2010/main" val="435097391"/>
+              </p:ext>
+            </p:extLst>
+          </p:nvPr>
+        </p:nvGraphicFramePr>
+        <p:xfrm>
+          <a:off x="1943100" y="3412066"/>
+          <a:ext cx="8128000" cy="1112520"/>
+        </p:xfrm>
+        <a:graphic>
+          <a:graphicData uri="http://schemas.openxmlformats.org/drawingml/2006/table">
+            <a:tbl>
+              <a:tblPr firstRow="1" bandRow="1">
+                <a:tableStyleId>{5940675A-B579-460E-94D1-54222C63F5DA}</a:tableStyleId>
+              </a:tblPr>
+              <a:tblGrid>
+                <a:gridCol w="1016000">
+                  <a:extLst>
+                    <a:ext uri="{9D8B030D-6E8A-4147-A177-3AD203B41FA5}">
+                      <a16:colId xmlns:a16="http://schemas.microsoft.com/office/drawing/2014/main" val="1636198692"/>
+                    </a:ext>
+                  </a:extLst>
+                </a:gridCol>
+                <a:gridCol w="1016000">
+                  <a:extLst>
+                    <a:ext uri="{9D8B030D-6E8A-4147-A177-3AD203B41FA5}">
+                      <a16:colId xmlns:a16="http://schemas.microsoft.com/office/drawing/2014/main" val="481933961"/>
+                    </a:ext>
+                  </a:extLst>
+                </a:gridCol>
+                <a:gridCol w="1016000">
+                  <a:extLst>
+                    <a:ext uri="{9D8B030D-6E8A-4147-A177-3AD203B41FA5}">
+                      <a16:colId xmlns:a16="http://schemas.microsoft.com/office/drawing/2014/main" val="3415793772"/>
+                    </a:ext>
+                  </a:extLst>
+                </a:gridCol>
+                <a:gridCol w="1016000">
+                  <a:extLst>
+                    <a:ext uri="{9D8B030D-6E8A-4147-A177-3AD203B41FA5}">
+                      <a16:colId xmlns:a16="http://schemas.microsoft.com/office/drawing/2014/main" val="2852768689"/>
+                    </a:ext>
+                  </a:extLst>
+                </a:gridCol>
+                <a:gridCol w="1016000">
+                  <a:extLst>
+                    <a:ext uri="{9D8B030D-6E8A-4147-A177-3AD203B41FA5}">
+                      <a16:colId xmlns:a16="http://schemas.microsoft.com/office/drawing/2014/main" val="2144937605"/>
+                    </a:ext>
+                  </a:extLst>
+                </a:gridCol>
+                <a:gridCol w="1016000">
+                  <a:extLst>
+                    <a:ext uri="{9D8B030D-6E8A-4147-A177-3AD203B41FA5}">
+                      <a16:colId xmlns:a16="http://schemas.microsoft.com/office/drawing/2014/main" val="1376724382"/>
+                    </a:ext>
+                  </a:extLst>
+                </a:gridCol>
+                <a:gridCol w="1016000">
+                  <a:extLst>
+                    <a:ext uri="{9D8B030D-6E8A-4147-A177-3AD203B41FA5}">
+                      <a16:colId xmlns:a16="http://schemas.microsoft.com/office/drawing/2014/main" val="3473342088"/>
+                    </a:ext>
+                  </a:extLst>
+                </a:gridCol>
+                <a:gridCol w="1016000">
+                  <a:extLst>
+                    <a:ext uri="{9D8B030D-6E8A-4147-A177-3AD203B41FA5}">
+                      <a16:colId xmlns:a16="http://schemas.microsoft.com/office/drawing/2014/main" val="3687628291"/>
+                    </a:ext>
+                  </a:extLst>
+                </a:gridCol>
+              </a:tblGrid>
+              <a:tr h="370840">
+                <a:tc>
+                  <a:txBody>
+                    <a:bodyPr/>
+                    <a:lstStyle/>
+                    <a:p>
+                      <a:pPr latinLnBrk="1"/>
+                      <a:endParaRPr lang="ko-KR" altLang="en-US" dirty="0"/>
+                    </a:p>
+                  </a:txBody>
+                  <a:tcPr/>
+                </a:tc>
+                <a:tc>
+                  <a:txBody>
+                    <a:bodyPr/>
+                    <a:lstStyle/>
+                    <a:p>
+                      <a:pPr latinLnBrk="1"/>
+                      <a:endParaRPr lang="ko-KR" altLang="en-US"/>
+                    </a:p>
+                  </a:txBody>
+                  <a:tcPr/>
+                </a:tc>
+                <a:tc>
+                  <a:txBody>
+                    <a:bodyPr/>
+                    <a:lstStyle/>
+                    <a:p>
+                      <a:pPr latinLnBrk="1"/>
+                      <a:endParaRPr lang="ko-KR" altLang="en-US"/>
+                    </a:p>
+                  </a:txBody>
+                  <a:tcPr/>
+                </a:tc>
+                <a:tc>
+                  <a:txBody>
+                    <a:bodyPr/>
+                    <a:lstStyle/>
+                    <a:p>
+                      <a:pPr latinLnBrk="1"/>
+                      <a:endParaRPr lang="ko-KR" altLang="en-US"/>
+                    </a:p>
+                  </a:txBody>
+                  <a:tcPr/>
+                </a:tc>
+                <a:tc>
+                  <a:txBody>
+                    <a:bodyPr/>
+                    <a:lstStyle/>
+                    <a:p>
+                      <a:pPr latinLnBrk="1"/>
+                      <a:endParaRPr lang="ko-KR" altLang="en-US"/>
+                    </a:p>
+                  </a:txBody>
+                  <a:tcPr/>
+                </a:tc>
+                <a:tc>
+                  <a:txBody>
+                    <a:bodyPr/>
+                    <a:lstStyle/>
+                    <a:p>
+                      <a:pPr latinLnBrk="1"/>
+                      <a:endParaRPr lang="ko-KR" altLang="en-US"/>
+                    </a:p>
+                  </a:txBody>
+                  <a:tcPr/>
+                </a:tc>
+                <a:tc>
+                  <a:txBody>
+                    <a:bodyPr/>
+                    <a:lstStyle/>
+                    <a:p>
+                      <a:pPr latinLnBrk="1"/>
+                      <a:endParaRPr lang="ko-KR" altLang="en-US"/>
+                    </a:p>
+                  </a:txBody>
+                  <a:tcPr/>
+                </a:tc>
+                <a:tc>
+                  <a:txBody>
+                    <a:bodyPr/>
+                    <a:lstStyle/>
+                    <a:p>
+                      <a:pPr latinLnBrk="1"/>
+                      <a:endParaRPr lang="ko-KR" altLang="en-US"/>
+                    </a:p>
+                  </a:txBody>
+                  <a:tcPr/>
+                </a:tc>
+                <a:extLst>
+                  <a:ext uri="{0D108BD9-81ED-4DB2-BD59-A6C34878D82A}">
+                    <a16:rowId xmlns:a16="http://schemas.microsoft.com/office/drawing/2014/main" val="2954241271"/>
+                  </a:ext>
+                </a:extLst>
+              </a:tr>
+              <a:tr h="370840">
+                <a:tc>
+                  <a:txBody>
+                    <a:bodyPr/>
+                    <a:lstStyle/>
+                    <a:p>
+                      <a:pPr latinLnBrk="1"/>
+                      <a:endParaRPr lang="ko-KR" altLang="en-US"/>
+                    </a:p>
+                  </a:txBody>
+                  <a:tcPr/>
+                </a:tc>
+                <a:tc>
+                  <a:txBody>
+                    <a:bodyPr/>
+                    <a:lstStyle/>
+                    <a:p>
+                      <a:pPr latinLnBrk="1"/>
+                      <a:endParaRPr lang="ko-KR" altLang="en-US"/>
+                    </a:p>
+                  </a:txBody>
+                  <a:tcPr/>
+                </a:tc>
+                <a:tc>
+                  <a:txBody>
+                    <a:bodyPr/>
+                    <a:lstStyle/>
+                    <a:p>
+                      <a:pPr latinLnBrk="1"/>
+                      <a:endParaRPr lang="ko-KR" altLang="en-US"/>
+                    </a:p>
+                  </a:txBody>
+                  <a:tcPr/>
+                </a:tc>
+                <a:tc>
+                  <a:txBody>
+                    <a:bodyPr/>
+                    <a:lstStyle/>
+                    <a:p>
+                      <a:pPr latinLnBrk="1"/>
+                      <a:endParaRPr lang="ko-KR" altLang="en-US"/>
+                    </a:p>
+                  </a:txBody>
+                  <a:tcPr/>
+                </a:tc>
+                <a:tc>
+                  <a:txBody>
+                    <a:bodyPr/>
+                    <a:lstStyle/>
+                    <a:p>
+                      <a:pPr latinLnBrk="1"/>
+                      <a:endParaRPr lang="ko-KR" altLang="en-US"/>
+                    </a:p>
+                  </a:txBody>
+                  <a:tcPr/>
+                </a:tc>
+                <a:tc>
+                  <a:txBody>
+                    <a:bodyPr/>
+                    <a:lstStyle/>
+                    <a:p>
+                      <a:pPr latinLnBrk="1"/>
+                      <a:endParaRPr lang="ko-KR" altLang="en-US"/>
+                    </a:p>
+                  </a:txBody>
+                  <a:tcPr/>
+                </a:tc>
+                <a:tc>
+                  <a:txBody>
+                    <a:bodyPr/>
+                    <a:lstStyle/>
+                    <a:p>
+                      <a:pPr latinLnBrk="1"/>
+                      <a:endParaRPr lang="ko-KR" altLang="en-US"/>
+                    </a:p>
+                  </a:txBody>
+                  <a:tcPr/>
+                </a:tc>
+                <a:tc>
+                  <a:txBody>
+                    <a:bodyPr/>
+                    <a:lstStyle/>
+                    <a:p>
+                      <a:pPr latinLnBrk="1"/>
+                      <a:endParaRPr lang="ko-KR" altLang="en-US"/>
+                    </a:p>
+                  </a:txBody>
+                  <a:tcPr/>
+                </a:tc>
+                <a:extLst>
+                  <a:ext uri="{0D108BD9-81ED-4DB2-BD59-A6C34878D82A}">
+                    <a16:rowId xmlns:a16="http://schemas.microsoft.com/office/drawing/2014/main" val="1815343335"/>
+                  </a:ext>
+                </a:extLst>
+              </a:tr>
+              <a:tr h="370840">
+                <a:tc>
+                  <a:txBody>
+                    <a:bodyPr/>
+                    <a:lstStyle/>
+                    <a:p>
+                      <a:pPr latinLnBrk="1"/>
+                      <a:endParaRPr lang="ko-KR" altLang="en-US"/>
+                    </a:p>
+                  </a:txBody>
+                  <a:tcPr/>
+                </a:tc>
+                <a:tc>
+                  <a:txBody>
+                    <a:bodyPr/>
+                    <a:lstStyle/>
+                    <a:p>
+                      <a:pPr latinLnBrk="1"/>
+                      <a:endParaRPr lang="ko-KR" altLang="en-US"/>
+                    </a:p>
+                  </a:txBody>
+                  <a:tcPr/>
+                </a:tc>
+                <a:tc>
+                  <a:txBody>
+                    <a:bodyPr/>
+                    <a:lstStyle/>
+                    <a:p>
+                      <a:pPr latinLnBrk="1"/>
+                      <a:endParaRPr lang="ko-KR" altLang="en-US"/>
+                    </a:p>
+                  </a:txBody>
+                  <a:tcPr/>
+                </a:tc>
+                <a:tc>
+                  <a:txBody>
+                    <a:bodyPr/>
+                    <a:lstStyle/>
+                    <a:p>
+                      <a:pPr latinLnBrk="1"/>
+                      <a:endParaRPr lang="ko-KR" altLang="en-US"/>
+                    </a:p>
+                  </a:txBody>
+                  <a:tcPr/>
+                </a:tc>
+                <a:tc>
+                  <a:txBody>
+                    <a:bodyPr/>
+                    <a:lstStyle/>
+                    <a:p>
+                      <a:pPr latinLnBrk="1"/>
+                      <a:endParaRPr lang="ko-KR" altLang="en-US"/>
+                    </a:p>
+                  </a:txBody>
+                  <a:tcPr/>
+                </a:tc>
+                <a:tc>
+                  <a:txBody>
+                    <a:bodyPr/>
+                    <a:lstStyle/>
+                    <a:p>
+                      <a:pPr latinLnBrk="1"/>
+                      <a:endParaRPr lang="ko-KR" altLang="en-US"/>
+                    </a:p>
+                  </a:txBody>
+                  <a:tcPr/>
+                </a:tc>
+                <a:tc>
+                  <a:txBody>
+                    <a:bodyPr/>
+                    <a:lstStyle/>
+                    <a:p>
+                      <a:pPr latinLnBrk="1"/>
+                      <a:endParaRPr lang="ko-KR" altLang="en-US"/>
+                    </a:p>
+                  </a:txBody>
+                  <a:tcPr/>
+                </a:tc>
+                <a:tc>
+                  <a:txBody>
+                    <a:bodyPr/>
+                    <a:lstStyle/>
+                    <a:p>
+                      <a:pPr latinLnBrk="1"/>
+                      <a:endParaRPr lang="ko-KR" altLang="en-US" dirty="0"/>
+                    </a:p>
+                  </a:txBody>
+                  <a:tcPr/>
+                </a:tc>
+                <a:extLst>
+                  <a:ext uri="{0D108BD9-81ED-4DB2-BD59-A6C34878D82A}">
+                    <a16:rowId xmlns:a16="http://schemas.microsoft.com/office/drawing/2014/main" val="3975939568"/>
+                  </a:ext>
+                </a:extLst>
+              </a:tr>
+            </a:tbl>
+          </a:graphicData>
+        </a:graphic>
+      </p:graphicFrame>
+    </p:spTree>
+    <p:extLst>
+      <p:ext uri="{BB962C8B-B14F-4D97-AF65-F5344CB8AC3E}">
+        <p14:creationId xmlns:p14="http://schemas.microsoft.com/office/powerpoint/2010/main" val="655901573"/>
       </p:ext>
     </p:extLst>
   </p:cSld>

</xml_diff>